<commit_message>
Post lezione, annno 1
</commit_message>
<xml_diff>
--- a/Pandas.pptx
+++ b/Pandas.pptx
@@ -271,7 +271,7 @@
           <a:p>
             <a:fld id="{63A1C593-65D0-4073-BCC9-577B9352EA97}" type="datetimeFigureOut">
               <a:rPr lang="en-US" smtClean="0"/>
-              <a:t>5/4/2020</a:t>
+              <a:t>5/7/2020</a:t>
             </a:fld>
             <a:endParaRPr lang="en-US"/>
           </a:p>
@@ -441,7 +441,7 @@
           <a:p>
             <a:fld id="{63A1C593-65D0-4073-BCC9-577B9352EA97}" type="datetimeFigureOut">
               <a:rPr lang="en-US" smtClean="0"/>
-              <a:t>5/4/2020</a:t>
+              <a:t>5/7/2020</a:t>
             </a:fld>
             <a:endParaRPr lang="en-US"/>
           </a:p>
@@ -621,7 +621,7 @@
           <a:p>
             <a:fld id="{63A1C593-65D0-4073-BCC9-577B9352EA97}" type="datetimeFigureOut">
               <a:rPr lang="en-US" smtClean="0"/>
-              <a:t>5/4/2020</a:t>
+              <a:t>5/7/2020</a:t>
             </a:fld>
             <a:endParaRPr lang="en-US"/>
           </a:p>
@@ -791,7 +791,7 @@
           <a:p>
             <a:fld id="{63A1C593-65D0-4073-BCC9-577B9352EA97}" type="datetimeFigureOut">
               <a:rPr lang="en-US" smtClean="0"/>
-              <a:t>5/4/2020</a:t>
+              <a:t>5/7/2020</a:t>
             </a:fld>
             <a:endParaRPr lang="en-US"/>
           </a:p>
@@ -1037,7 +1037,7 @@
           <a:p>
             <a:fld id="{63A1C593-65D0-4073-BCC9-577B9352EA97}" type="datetimeFigureOut">
               <a:rPr lang="en-US" smtClean="0"/>
-              <a:t>5/4/2020</a:t>
+              <a:t>5/7/2020</a:t>
             </a:fld>
             <a:endParaRPr lang="en-US"/>
           </a:p>
@@ -1269,7 +1269,7 @@
           <a:p>
             <a:fld id="{63A1C593-65D0-4073-BCC9-577B9352EA97}" type="datetimeFigureOut">
               <a:rPr lang="en-US" smtClean="0"/>
-              <a:t>5/4/2020</a:t>
+              <a:t>5/7/2020</a:t>
             </a:fld>
             <a:endParaRPr lang="en-US"/>
           </a:p>
@@ -1636,7 +1636,7 @@
           <a:p>
             <a:fld id="{63A1C593-65D0-4073-BCC9-577B9352EA97}" type="datetimeFigureOut">
               <a:rPr lang="en-US" smtClean="0"/>
-              <a:t>5/4/2020</a:t>
+              <a:t>5/7/2020</a:t>
             </a:fld>
             <a:endParaRPr lang="en-US"/>
           </a:p>
@@ -1754,7 +1754,7 @@
           <a:p>
             <a:fld id="{63A1C593-65D0-4073-BCC9-577B9352EA97}" type="datetimeFigureOut">
               <a:rPr lang="en-US" smtClean="0"/>
-              <a:t>5/4/2020</a:t>
+              <a:t>5/7/2020</a:t>
             </a:fld>
             <a:endParaRPr lang="en-US"/>
           </a:p>
@@ -1849,7 +1849,7 @@
           <a:p>
             <a:fld id="{63A1C593-65D0-4073-BCC9-577B9352EA97}" type="datetimeFigureOut">
               <a:rPr lang="en-US" smtClean="0"/>
-              <a:t>5/4/2020</a:t>
+              <a:t>5/7/2020</a:t>
             </a:fld>
             <a:endParaRPr lang="en-US"/>
           </a:p>
@@ -2126,7 +2126,7 @@
           <a:p>
             <a:fld id="{63A1C593-65D0-4073-BCC9-577B9352EA97}" type="datetimeFigureOut">
               <a:rPr lang="en-US" smtClean="0"/>
-              <a:t>5/4/2020</a:t>
+              <a:t>5/7/2020</a:t>
             </a:fld>
             <a:endParaRPr lang="en-US"/>
           </a:p>
@@ -2379,7 +2379,7 @@
           <a:p>
             <a:fld id="{63A1C593-65D0-4073-BCC9-577B9352EA97}" type="datetimeFigureOut">
               <a:rPr lang="en-US" smtClean="0"/>
-              <a:t>5/4/2020</a:t>
+              <a:t>5/7/2020</a:t>
             </a:fld>
             <a:endParaRPr lang="en-US"/>
           </a:p>
@@ -2592,7 +2592,7 @@
           <a:p>
             <a:fld id="{63A1C593-65D0-4073-BCC9-577B9352EA97}" type="datetimeFigureOut">
               <a:rPr lang="en-US" smtClean="0"/>
-              <a:t>5/4/2020</a:t>
+              <a:t>5/7/2020</a:t>
             </a:fld>
             <a:endParaRPr lang="en-US"/>
           </a:p>
@@ -3358,7 +3358,11 @@
           <a:p>
             <a:r>
               <a:rPr lang="en-US" dirty="0"/>
-              <a:t>There are two options in dealing with nulls</a:t>
+              <a:t>There are </a:t>
+            </a:r>
+            <a:r>
+              <a:rPr lang="en-US" b="1" dirty="0"/>
+              <a:t>two options in dealing with nulls</a:t>
             </a:r>
             <a:r>
               <a:rPr lang="en-US" dirty="0" smtClean="0"/>
@@ -3377,7 +3381,11 @@
             <a:pPr lvl="1"/>
             <a:r>
               <a:rPr lang="en-US" dirty="0"/>
-              <a:t>Replace nulls with non-null values, a technique known as imputation</a:t>
+              <a:t>Replace nulls with non-null values, a technique known as </a:t>
+            </a:r>
+            <a:r>
+              <a:rPr lang="en-US" b="1" dirty="0"/>
+              <a:t>imputation</a:t>
             </a:r>
           </a:p>
         </p:txBody>
@@ -3570,8 +3578,12 @@
           <a:lstStyle/>
           <a:p>
             <a:r>
-              <a:rPr lang="en-US" dirty="0"/>
-              <a:t>Imputation is a conventional feature engineering technique used to keep valuable data that have null values.</a:t>
+              <a:rPr lang="en-US" b="1" dirty="0"/>
+              <a:t>Imputation</a:t>
+            </a:r>
+            <a:r>
+              <a:rPr lang="en-US" dirty="0"/>
+              <a:t> is a conventional feature engineering technique used to keep valuable data that have null values.</a:t>
             </a:r>
           </a:p>
           <a:p>
@@ -4566,7 +4578,6 @@
               <a:rPr lang="en-US" dirty="0" smtClean="0"/>
               <a:t>") # True False True, etc.</a:t>
             </a:r>
-            <a:endParaRPr lang="en-US" dirty="0" smtClean="0"/>
           </a:p>
           <a:p>
             <a:r>
@@ -6743,7 +6754,9 @@
         </p:nvSpPr>
         <p:spPr/>
         <p:txBody>
-          <a:bodyPr/>
+          <a:bodyPr>
+            <a:normAutofit/>
+          </a:bodyPr>
           <a:lstStyle/>
           <a:p>
             <a:r>
@@ -6777,12 +6790,13 @@
             </a:r>
             <a:r>
               <a:rPr lang="it-IT" dirty="0" smtClean="0"/>
-              <a:t>ate </a:t>
+              <a:t>ate records with </a:t>
             </a:r>
             <a:r>
               <a:rPr lang="it-IT" dirty="0" smtClean="0"/>
-              <a:t>records with indices</a:t>
-            </a:r>
+              <a:t>indices (one or more)</a:t>
+            </a:r>
+            <a:endParaRPr lang="it-IT" dirty="0" smtClean="0"/>
           </a:p>
           <a:p>
             <a:pPr lvl="1"/>
@@ -6796,15 +6810,55 @@
             </a:r>
             <a:r>
               <a:rPr lang="en-US" dirty="0" smtClean="0"/>
+              <a:t>'] # June is a person name </a:t>
+            </a:r>
+            <a:endParaRPr lang="en-US" dirty="0" smtClean="0"/>
+          </a:p>
+          <a:p>
+            <a:pPr lvl="1"/>
+            <a:r>
+              <a:rPr lang="it-IT" dirty="0" smtClean="0"/>
+              <a:t>(iloc for integer index</a:t>
+            </a:r>
+            <a:r>
+              <a:rPr lang="it-IT" dirty="0" smtClean="0"/>
+              <a:t>)</a:t>
+            </a:r>
+          </a:p>
+          <a:p>
+            <a:pPr lvl="1"/>
+            <a:r>
+              <a:rPr lang="it-IT" dirty="0" smtClean="0"/>
+              <a:t>Movies.loc</a:t>
+            </a:r>
+            <a:r>
+              <a:rPr lang="en-US" dirty="0"/>
+              <a:t>['</a:t>
+            </a:r>
+            <a:r>
+              <a:rPr lang="en-US" dirty="0" err="1"/>
+              <a:t>Prometheus':'Sing</a:t>
+            </a:r>
+            <a:r>
+              <a:rPr lang="en-US" dirty="0" smtClean="0"/>
               <a:t>']</a:t>
             </a:r>
+            <a:endParaRPr lang="it-IT" dirty="0" smtClean="0"/>
           </a:p>
           <a:p>
             <a:pPr lvl="1"/>
             <a:r>
               <a:rPr lang="it-IT" dirty="0" smtClean="0"/>
-              <a:t>(iloc for integer index)</a:t>
-            </a:r>
+              <a:t>Movies.iloc</a:t>
+            </a:r>
+            <a:r>
+              <a:rPr lang="en-US" dirty="0" smtClean="0"/>
+              <a:t>[1:4]</a:t>
+            </a:r>
+            <a:endParaRPr lang="en-US" dirty="0"/>
+          </a:p>
+          <a:p>
+            <a:pPr lvl="1"/>
             <a:endParaRPr lang="en-US" dirty="0"/>
           </a:p>
         </p:txBody>
@@ -7220,7 +7274,11 @@
             </a:r>
             <a:r>
               <a:rPr lang="en-US" dirty="0" smtClean="0"/>
-              <a:t>()</a:t>
+              <a:t>() </a:t>
+            </a:r>
+            <a:r>
+              <a:rPr lang="en-US" dirty="0"/>
+              <a:t># How many non null entries per column, incl. index. Column type</a:t>
             </a:r>
           </a:p>
           <a:p>
@@ -7234,11 +7292,7 @@
             </a:r>
             <a:r>
               <a:rPr lang="en-US" dirty="0" smtClean="0"/>
-              <a:t># (</a:t>
-            </a:r>
-            <a:r>
-              <a:rPr lang="en-US" dirty="0" smtClean="0"/>
-              <a:t>1000, 11)</a:t>
+              <a:t># (1000, 11)</a:t>
             </a:r>
           </a:p>
           <a:p>
@@ -7352,7 +7406,11 @@
             </a:r>
             <a:r>
               <a:rPr lang="en-US" dirty="0" smtClean="0"/>
-              <a:t> (2000, 11)</a:t>
+              <a:t> # </a:t>
+            </a:r>
+            <a:r>
+              <a:rPr lang="en-US" dirty="0" smtClean="0"/>
+              <a:t>(2000, 11)</a:t>
             </a:r>
           </a:p>
           <a:p>

</xml_diff>